<commit_message>
finished with gdb slides
</commit_message>
<xml_diff>
--- a/GDB and Git.pptx
+++ b/GDB and Git.pptx
@@ -18,6 +18,8 @@
     <p:sldId id="266" r:id="rId12"/>
     <p:sldId id="267" r:id="rId13"/>
     <p:sldId id="268" r:id="rId14"/>
+    <p:sldId id="269" r:id="rId15"/>
+    <p:sldId id="270" r:id="rId16"/>
   </p:sldIdLst>
   <p:sldSz cx="12192000" cy="6858000"/>
   <p:notesSz cx="6858000" cy="9144000"/>
@@ -6308,6 +6310,12 @@
             </a:r>
           </a:p>
           <a:p>
+            <a:pPr marL="914400" lvl="2" indent="0">
+              <a:buNone/>
+            </a:pPr>
+            <a:endParaRPr lang="en-US" dirty="0"/>
+          </a:p>
+          <a:p>
             <a:r>
               <a:rPr lang="en-US" b="1" dirty="0">
                 <a:solidFill>
@@ -6412,11 +6420,13 @@
           </a:xfrm>
         </p:spPr>
         <p:txBody>
-          <a:bodyPr/>
-          <a:lstStyle/>
-          <a:p>
-            <a:r>
-              <a:rPr lang="en-US" b="1" dirty="0">
+          <a:bodyPr>
+            <a:noAutofit/>
+          </a:bodyPr>
+          <a:lstStyle/>
+          <a:p>
+            <a:r>
+              <a:rPr lang="en-US" sz="1500" b="1" dirty="0">
                 <a:solidFill>
                   <a:srgbClr val="FF0000"/>
                 </a:solidFill>
@@ -6424,25 +6434,25 @@
               <a:t>list</a:t>
             </a:r>
             <a:r>
-              <a:rPr lang="en-US" dirty="0"/>
+              <a:rPr lang="en-US" sz="1500" dirty="0"/>
               <a:t> &lt;location&gt;</a:t>
             </a:r>
           </a:p>
           <a:p>
             <a:pPr lvl="1"/>
             <a:r>
-              <a:rPr lang="en-US" dirty="0"/>
+              <a:rPr lang="en-US" sz="1500" dirty="0"/>
               <a:t>Lists lines (default 10) of source code starting at location.</a:t>
             </a:r>
           </a:p>
           <a:p>
             <a:pPr lvl="2"/>
             <a:r>
-              <a:rPr lang="en-US" dirty="0"/>
+              <a:rPr lang="en-US" sz="1500" dirty="0"/>
               <a:t>Use </a:t>
             </a:r>
             <a:r>
-              <a:rPr lang="en-US" dirty="0">
+              <a:rPr lang="en-US" sz="1500" dirty="0">
                 <a:solidFill>
                   <a:srgbClr val="FF0000"/>
                 </a:solidFill>
@@ -6450,7 +6460,7 @@
               <a:t>set </a:t>
             </a:r>
             <a:r>
-              <a:rPr lang="en-US" dirty="0" err="1">
+              <a:rPr lang="en-US" sz="1500" dirty="0" err="1">
                 <a:solidFill>
                   <a:srgbClr val="FF0000"/>
                 </a:solidFill>
@@ -6458,7 +6468,7 @@
               <a:t>listsize</a:t>
             </a:r>
             <a:r>
-              <a:rPr lang="en-US" dirty="0">
+              <a:rPr lang="en-US" sz="1500" dirty="0">
                 <a:solidFill>
                   <a:srgbClr val="FF0000"/>
                 </a:solidFill>
@@ -6466,18 +6476,18 @@
               <a:t> </a:t>
             </a:r>
             <a:r>
-              <a:rPr lang="en-US" dirty="0"/>
+              <a:rPr lang="en-US" sz="1500" dirty="0"/>
               <a:t>to change the default.</a:t>
             </a:r>
           </a:p>
           <a:p>
             <a:pPr lvl="1"/>
             <a:r>
-              <a:rPr lang="en-US" dirty="0"/>
+              <a:rPr lang="en-US" sz="1500" dirty="0"/>
               <a:t>Location is specified similar to </a:t>
             </a:r>
             <a:r>
-              <a:rPr lang="en-US" b="1" dirty="0">
+              <a:rPr lang="en-US" sz="1500" b="1" dirty="0">
                 <a:solidFill>
                   <a:srgbClr val="FF0000"/>
                 </a:solidFill>
@@ -6485,17 +6495,13 @@
               <a:t>break</a:t>
             </a:r>
             <a:r>
-              <a:rPr lang="en-US" dirty="0"/>
+              <a:rPr lang="en-US" sz="1500" dirty="0"/>
               <a:t>.</a:t>
             </a:r>
           </a:p>
           <a:p>
-            <a:pPr lvl="1"/>
-            <a:endParaRPr lang="en-US" dirty="0"/>
-          </a:p>
-          <a:p>
-            <a:r>
-              <a:rPr lang="en-US" b="1" dirty="0">
+            <a:r>
+              <a:rPr lang="en-US" sz="1500" b="1" dirty="0">
                 <a:solidFill>
                   <a:srgbClr val="FF0000"/>
                 </a:solidFill>
@@ -6503,24 +6509,20 @@
               <a:t>disassemble</a:t>
             </a:r>
             <a:r>
-              <a:rPr lang="en-US" dirty="0"/>
+              <a:rPr lang="en-US" sz="1500" dirty="0"/>
               <a:t> [location]</a:t>
             </a:r>
           </a:p>
           <a:p>
             <a:pPr lvl="1"/>
             <a:r>
-              <a:rPr lang="en-US" dirty="0"/>
+              <a:rPr lang="en-US" sz="1500" dirty="0"/>
               <a:t>Lists assembly instructions focused around location (or current execution line if none specified).</a:t>
             </a:r>
           </a:p>
           <a:p>
-            <a:pPr lvl="1"/>
-            <a:endParaRPr lang="en-US" dirty="0"/>
-          </a:p>
-          <a:p>
-            <a:r>
-              <a:rPr lang="en-US" b="1" dirty="0">
+            <a:r>
+              <a:rPr lang="en-US" sz="1500" b="1" dirty="0">
                 <a:solidFill>
                   <a:srgbClr val="FF0000"/>
                 </a:solidFill>
@@ -6528,24 +6530,95 @@
               <a:t>info</a:t>
             </a:r>
             <a:r>
-              <a:rPr lang="en-US" dirty="0"/>
+              <a:rPr lang="en-US" sz="1500" dirty="0"/>
               <a:t> &lt;command&gt;</a:t>
             </a:r>
           </a:p>
           <a:p>
             <a:pPr lvl="1"/>
             <a:r>
-              <a:rPr lang="en-US" dirty="0"/>
+              <a:rPr lang="en-US" sz="1500" dirty="0"/>
               <a:t>Many subcommands available, although most used one will probably be </a:t>
             </a:r>
             <a:r>
-              <a:rPr lang="en-US" dirty="0" err="1"/>
+              <a:rPr lang="en-US" sz="1500" dirty="0" err="1"/>
               <a:t>reg</a:t>
             </a:r>
             <a:r>
-              <a:rPr lang="en-US" dirty="0"/>
+              <a:rPr lang="en-US" sz="1500" dirty="0"/>
               <a:t> (info registers).</a:t>
             </a:r>
+          </a:p>
+          <a:p>
+            <a:r>
+              <a:rPr lang="en-US" sz="1500" b="1" dirty="0">
+                <a:solidFill>
+                  <a:srgbClr val="FF0000"/>
+                </a:solidFill>
+              </a:rPr>
+              <a:t>p</a:t>
+            </a:r>
+            <a:r>
+              <a:rPr lang="en-US" sz="1500" dirty="0"/>
+              <a:t> &lt;expression&gt;</a:t>
+            </a:r>
+          </a:p>
+          <a:p>
+            <a:pPr lvl="1"/>
+            <a:r>
+              <a:rPr lang="en-US" sz="1500" dirty="0"/>
+              <a:t>Prints the value of the expression. </a:t>
+            </a:r>
+          </a:p>
+          <a:p>
+            <a:pPr lvl="2"/>
+            <a:r>
+              <a:rPr lang="en-US" sz="1300" dirty="0"/>
+              <a:t>p </a:t>
+            </a:r>
+            <a:r>
+              <a:rPr lang="en-US" sz="1300" dirty="0" err="1"/>
+              <a:t>buf</a:t>
+            </a:r>
+            <a:r>
+              <a:rPr lang="en-US" sz="1300" dirty="0"/>
+              <a:t> (print the value of </a:t>
+            </a:r>
+            <a:r>
+              <a:rPr lang="en-US" sz="1300" dirty="0" err="1"/>
+              <a:t>buf</a:t>
+            </a:r>
+            <a:r>
+              <a:rPr lang="en-US" sz="1300" dirty="0"/>
+              <a:t>)</a:t>
+            </a:r>
+          </a:p>
+          <a:p>
+            <a:pPr lvl="2"/>
+            <a:r>
+              <a:rPr lang="en-US" sz="1300" dirty="0"/>
+              <a:t>p &amp;</a:t>
+            </a:r>
+            <a:r>
+              <a:rPr lang="en-US" sz="1300" dirty="0" err="1"/>
+              <a:t>buf</a:t>
+            </a:r>
+            <a:r>
+              <a:rPr lang="en-US" sz="1300" dirty="0"/>
+              <a:t> (print the address of </a:t>
+            </a:r>
+            <a:r>
+              <a:rPr lang="en-US" sz="1300" dirty="0" err="1"/>
+              <a:t>buf</a:t>
+            </a:r>
+            <a:r>
+              <a:rPr lang="en-US" sz="1300" dirty="0"/>
+              <a:t>)</a:t>
+            </a:r>
+          </a:p>
+          <a:p>
+            <a:pPr lvl="2"/>
+            <a:endParaRPr lang="en-US" sz="1300" dirty="0"/>
           </a:p>
         </p:txBody>
       </p:sp>
@@ -6619,7 +6692,7 @@
         <p:spPr>
           <a:xfrm>
             <a:off x="1104293" y="1489392"/>
-            <a:ext cx="8946541" cy="4195481"/>
+            <a:ext cx="8946541" cy="5081529"/>
           </a:xfrm>
         </p:spPr>
         <p:txBody>
@@ -6664,8 +6737,8 @@
         </p:blipFill>
         <p:spPr>
           <a:xfrm>
-            <a:off x="1764084" y="2376073"/>
-            <a:ext cx="8286750" cy="4067175"/>
+            <a:off x="1908866" y="2307265"/>
+            <a:ext cx="7343935" cy="3604437"/>
           </a:xfrm>
           <a:prstGeom prst="rect">
             <a:avLst/>
@@ -6676,6 +6749,447 @@
     <p:extLst>
       <p:ext uri="{BB962C8B-B14F-4D97-AF65-F5344CB8AC3E}">
         <p14:creationId xmlns:p14="http://schemas.microsoft.com/office/powerpoint/2010/main" val="1891320432"/>
+      </p:ext>
+    </p:extLst>
+  </p:cSld>
+  <p:clrMapOvr>
+    <a:masterClrMapping/>
+  </p:clrMapOvr>
+</p:sld>
+</file>
+
+<file path=ppt/slides/slide14.xml><?xml version="1.0" encoding="utf-8"?>
+<p:sld xmlns:a="http://schemas.openxmlformats.org/drawingml/2006/main" xmlns:r="http://schemas.openxmlformats.org/officeDocument/2006/relationships" xmlns:p="http://schemas.openxmlformats.org/presentationml/2006/main">
+  <p:cSld>
+    <p:spTree>
+      <p:nvGrpSpPr>
+        <p:cNvPr id="1" name=""/>
+        <p:cNvGrpSpPr/>
+        <p:nvPr/>
+      </p:nvGrpSpPr>
+      <p:grpSpPr>
+        <a:xfrm>
+          <a:off x="0" y="0"/>
+          <a:ext cx="0" cy="0"/>
+          <a:chOff x="0" y="0"/>
+          <a:chExt cx="0" cy="0"/>
+        </a:xfrm>
+      </p:grpSpPr>
+      <p:sp>
+        <p:nvSpPr>
+          <p:cNvPr id="9" name="Title 8"/>
+          <p:cNvSpPr>
+            <a:spLocks noGrp="1"/>
+          </p:cNvSpPr>
+          <p:nvPr>
+            <p:ph type="title"/>
+          </p:nvPr>
+        </p:nvSpPr>
+        <p:spPr/>
+        <p:txBody>
+          <a:bodyPr/>
+          <a:lstStyle/>
+          <a:p>
+            <a:r>
+              <a:rPr lang="en-US" dirty="0"/>
+              <a:t>Manipulating Memory</a:t>
+            </a:r>
+          </a:p>
+        </p:txBody>
+      </p:sp>
+      <p:sp>
+        <p:nvSpPr>
+          <p:cNvPr id="11" name="Content Placeholder 2"/>
+          <p:cNvSpPr>
+            <a:spLocks noGrp="1"/>
+          </p:cNvSpPr>
+          <p:nvPr>
+            <p:ph idx="1"/>
+          </p:nvPr>
+        </p:nvSpPr>
+        <p:spPr>
+          <a:xfrm>
+            <a:off x="1104293" y="1489392"/>
+            <a:ext cx="8946541" cy="4195481"/>
+          </a:xfrm>
+        </p:spPr>
+        <p:txBody>
+          <a:bodyPr/>
+          <a:lstStyle/>
+          <a:p>
+            <a:r>
+              <a:rPr lang="en-US" b="1" dirty="0">
+                <a:solidFill>
+                  <a:srgbClr val="FF0000"/>
+                </a:solidFill>
+              </a:rPr>
+              <a:t>set</a:t>
+            </a:r>
+            <a:endParaRPr lang="en-US" dirty="0"/>
+          </a:p>
+          <a:p>
+            <a:pPr lvl="1"/>
+            <a:r>
+              <a:rPr lang="en-US" dirty="0"/>
+              <a:t>Sets a variable, address, register etc. to the specified value</a:t>
+            </a:r>
+          </a:p>
+          <a:p>
+            <a:pPr lvl="1"/>
+            <a:r>
+              <a:rPr lang="en-US" dirty="0"/>
+              <a:t>Can look a little messy</a:t>
+            </a:r>
+          </a:p>
+        </p:txBody>
+      </p:sp>
+      <p:pic>
+        <p:nvPicPr>
+          <p:cNvPr id="13" name="Picture 12"/>
+          <p:cNvPicPr>
+            <a:picLocks noChangeAspect="1"/>
+          </p:cNvPicPr>
+          <p:nvPr/>
+        </p:nvPicPr>
+        <p:blipFill>
+          <a:blip r:embed="rId2"/>
+          <a:stretch>
+            <a:fillRect/>
+          </a:stretch>
+        </p:blipFill>
+        <p:spPr>
+          <a:xfrm>
+            <a:off x="1104293" y="3148032"/>
+            <a:ext cx="8562975" cy="2200275"/>
+          </a:xfrm>
+          <a:prstGeom prst="rect">
+            <a:avLst/>
+          </a:prstGeom>
+        </p:spPr>
+      </p:pic>
+    </p:spTree>
+    <p:extLst>
+      <p:ext uri="{BB962C8B-B14F-4D97-AF65-F5344CB8AC3E}">
+        <p14:creationId xmlns:p14="http://schemas.microsoft.com/office/powerpoint/2010/main" val="2977349481"/>
+      </p:ext>
+    </p:extLst>
+  </p:cSld>
+  <p:clrMapOvr>
+    <a:masterClrMapping/>
+  </p:clrMapOvr>
+</p:sld>
+</file>
+
+<file path=ppt/slides/slide15.xml><?xml version="1.0" encoding="utf-8"?>
+<p:sld xmlns:a="http://schemas.openxmlformats.org/drawingml/2006/main" xmlns:r="http://schemas.openxmlformats.org/officeDocument/2006/relationships" xmlns:p="http://schemas.openxmlformats.org/presentationml/2006/main">
+  <p:cSld>
+    <p:spTree>
+      <p:nvGrpSpPr>
+        <p:cNvPr id="1" name=""/>
+        <p:cNvGrpSpPr/>
+        <p:nvPr/>
+      </p:nvGrpSpPr>
+      <p:grpSpPr>
+        <a:xfrm>
+          <a:off x="0" y="0"/>
+          <a:ext cx="0" cy="0"/>
+          <a:chOff x="0" y="0"/>
+          <a:chExt cx="0" cy="0"/>
+        </a:xfrm>
+      </p:grpSpPr>
+      <p:sp>
+        <p:nvSpPr>
+          <p:cNvPr id="2" name="Title 1"/>
+          <p:cNvSpPr>
+            <a:spLocks noGrp="1"/>
+          </p:cNvSpPr>
+          <p:nvPr>
+            <p:ph type="title"/>
+          </p:nvPr>
+        </p:nvSpPr>
+        <p:spPr/>
+        <p:txBody>
+          <a:bodyPr/>
+          <a:lstStyle/>
+          <a:p>
+            <a:r>
+              <a:rPr lang="en-US" dirty="0"/>
+              <a:t>Layouts</a:t>
+            </a:r>
+          </a:p>
+        </p:txBody>
+      </p:sp>
+      <p:sp>
+        <p:nvSpPr>
+          <p:cNvPr id="3" name="Content Placeholder 2"/>
+          <p:cNvSpPr>
+            <a:spLocks noGrp="1"/>
+          </p:cNvSpPr>
+          <p:nvPr>
+            <p:ph idx="1"/>
+          </p:nvPr>
+        </p:nvSpPr>
+        <p:spPr>
+          <a:xfrm>
+            <a:off x="1103312" y="1424763"/>
+            <a:ext cx="8946541" cy="5188687"/>
+          </a:xfrm>
+        </p:spPr>
+        <p:txBody>
+          <a:bodyPr>
+            <a:normAutofit/>
+          </a:bodyPr>
+          <a:lstStyle/>
+          <a:p>
+            <a:r>
+              <a:rPr lang="en-US" b="1" dirty="0">
+                <a:solidFill>
+                  <a:srgbClr val="FF0000"/>
+                </a:solidFill>
+              </a:rPr>
+              <a:t>layout</a:t>
+            </a:r>
+            <a:r>
+              <a:rPr lang="en-US" dirty="0"/>
+              <a:t> &lt;</a:t>
+            </a:r>
+            <a:r>
+              <a:rPr lang="en-US" dirty="0" err="1"/>
+              <a:t>asm</a:t>
+            </a:r>
+            <a:r>
+              <a:rPr lang="en-US" dirty="0"/>
+              <a:t> | </a:t>
+            </a:r>
+            <a:r>
+              <a:rPr lang="en-US" dirty="0" err="1"/>
+              <a:t>regs</a:t>
+            </a:r>
+            <a:r>
+              <a:rPr lang="en-US" dirty="0"/>
+              <a:t> | </a:t>
+            </a:r>
+            <a:r>
+              <a:rPr lang="en-US" dirty="0" err="1"/>
+              <a:t>src</a:t>
+            </a:r>
+            <a:r>
+              <a:rPr lang="en-US" dirty="0"/>
+              <a:t> | split&gt;</a:t>
+            </a:r>
+          </a:p>
+          <a:p>
+            <a:pPr lvl="1"/>
+            <a:r>
+              <a:rPr lang="en-US" dirty="0"/>
+              <a:t>Displays assembly, registers, source code or a combination of them!</a:t>
+            </a:r>
+            <a:br>
+              <a:rPr lang="en-US" dirty="0"/>
+            </a:br>
+            <a:br>
+              <a:rPr lang="en-US" dirty="0"/>
+            </a:br>
+            <a:br>
+              <a:rPr lang="en-US" dirty="0"/>
+            </a:br>
+            <a:br>
+              <a:rPr lang="en-US" dirty="0"/>
+            </a:br>
+            <a:br>
+              <a:rPr lang="en-US" dirty="0"/>
+            </a:br>
+            <a:br>
+              <a:rPr lang="en-US" dirty="0"/>
+            </a:br>
+            <a:br>
+              <a:rPr lang="en-US" dirty="0"/>
+            </a:br>
+            <a:br>
+              <a:rPr lang="en-US" dirty="0"/>
+            </a:br>
+            <a:br>
+              <a:rPr lang="en-US" dirty="0"/>
+            </a:br>
+            <a:br>
+              <a:rPr lang="en-US" dirty="0"/>
+            </a:br>
+            <a:br>
+              <a:rPr lang="en-US" dirty="0"/>
+            </a:br>
+            <a:br>
+              <a:rPr lang="en-US" dirty="0"/>
+            </a:br>
+            <a:endParaRPr lang="en-US" dirty="0"/>
+          </a:p>
+          <a:p>
+            <a:r>
+              <a:rPr lang="en-US" b="1" dirty="0">
+                <a:solidFill>
+                  <a:srgbClr val="FF0000"/>
+                </a:solidFill>
+              </a:rPr>
+              <a:t>focus</a:t>
+            </a:r>
+            <a:r>
+              <a:rPr lang="en-US" dirty="0"/>
+              <a:t> &lt;</a:t>
+            </a:r>
+            <a:r>
+              <a:rPr lang="en-US" dirty="0" err="1"/>
+              <a:t>asm</a:t>
+            </a:r>
+            <a:r>
+              <a:rPr lang="en-US" dirty="0"/>
+              <a:t> | </a:t>
+            </a:r>
+            <a:r>
+              <a:rPr lang="en-US" dirty="0" err="1"/>
+              <a:t>regs</a:t>
+            </a:r>
+            <a:r>
+              <a:rPr lang="en-US" dirty="0"/>
+              <a:t> | </a:t>
+            </a:r>
+            <a:r>
+              <a:rPr lang="en-US" dirty="0" err="1"/>
+              <a:t>src</a:t>
+            </a:r>
+            <a:r>
+              <a:rPr lang="en-US" dirty="0"/>
+              <a:t> | </a:t>
+            </a:r>
+            <a:r>
+              <a:rPr lang="en-US" dirty="0" err="1"/>
+              <a:t>cmd</a:t>
+            </a:r>
+            <a:r>
+              <a:rPr lang="en-US" dirty="0"/>
+              <a:t> | next | </a:t>
+            </a:r>
+            <a:r>
+              <a:rPr lang="en-US" dirty="0" err="1"/>
+              <a:t>prev</a:t>
+            </a:r>
+            <a:r>
+              <a:rPr lang="en-US" dirty="0"/>
+              <a:t>&gt;</a:t>
+            </a:r>
+          </a:p>
+          <a:p>
+            <a:pPr lvl="1"/>
+            <a:r>
+              <a:rPr lang="en-US" dirty="0"/>
+              <a:t>Change focus to specified pane. </a:t>
+            </a:r>
+          </a:p>
+        </p:txBody>
+      </p:sp>
+      <p:pic>
+        <p:nvPicPr>
+          <p:cNvPr id="4" name="Picture 3"/>
+          <p:cNvPicPr>
+            <a:picLocks noChangeAspect="1"/>
+          </p:cNvPicPr>
+          <p:nvPr/>
+        </p:nvPicPr>
+        <p:blipFill>
+          <a:blip r:embed="rId2"/>
+          <a:stretch>
+            <a:fillRect/>
+          </a:stretch>
+        </p:blipFill>
+        <p:spPr>
+          <a:xfrm>
+            <a:off x="2592434" y="2258006"/>
+            <a:ext cx="5512076" cy="3302046"/>
+          </a:xfrm>
+          <a:prstGeom prst="rect">
+            <a:avLst/>
+          </a:prstGeom>
+        </p:spPr>
+      </p:pic>
+      <p:sp>
+        <p:nvSpPr>
+          <p:cNvPr id="5" name="Rectangle 4"/>
+          <p:cNvSpPr/>
+          <p:nvPr/>
+        </p:nvSpPr>
+        <p:spPr>
+          <a:xfrm>
+            <a:off x="8771860" y="3306726"/>
+            <a:ext cx="2307266" cy="1573617"/>
+          </a:xfrm>
+          <a:prstGeom prst="rect">
+            <a:avLst/>
+          </a:prstGeom>
+        </p:spPr>
+        <p:style>
+          <a:lnRef idx="2">
+            <a:schemeClr val="accent1">
+              <a:shade val="50000"/>
+            </a:schemeClr>
+          </a:lnRef>
+          <a:fillRef idx="1">
+            <a:schemeClr val="accent1"/>
+          </a:fillRef>
+          <a:effectRef idx="0">
+            <a:schemeClr val="accent1"/>
+          </a:effectRef>
+          <a:fontRef idx="minor">
+            <a:schemeClr val="lt1"/>
+          </a:fontRef>
+        </p:style>
+        <p:txBody>
+          <a:bodyPr rtlCol="0" anchor="ctr"/>
+          <a:lstStyle/>
+          <a:p>
+            <a:pPr algn="ctr"/>
+            <a:endParaRPr lang="en-US"/>
+          </a:p>
+        </p:txBody>
+      </p:sp>
+      <p:sp>
+        <p:nvSpPr>
+          <p:cNvPr id="6" name="TextBox 5"/>
+          <p:cNvSpPr txBox="1"/>
+          <p:nvPr/>
+        </p:nvSpPr>
+        <p:spPr>
+          <a:xfrm>
+            <a:off x="8761228" y="3306726"/>
+            <a:ext cx="2317898" cy="1477328"/>
+          </a:xfrm>
+          <a:prstGeom prst="rect">
+            <a:avLst/>
+          </a:prstGeom>
+          <a:noFill/>
+        </p:spPr>
+        <p:txBody>
+          <a:bodyPr wrap="square" rtlCol="0">
+            <a:spAutoFit/>
+          </a:bodyPr>
+          <a:lstStyle/>
+          <a:p>
+            <a:pPr algn="ctr"/>
+            <a:r>
+              <a:rPr lang="en-US" dirty="0"/>
+              <a:t>Tip:</a:t>
+            </a:r>
+          </a:p>
+          <a:p>
+            <a:pPr algn="ctr"/>
+            <a:r>
+              <a:rPr lang="en-US" dirty="0"/>
+              <a:t>Use ‘Ctrl + x’ followed by ‘a’ to return to the normal interface.</a:t>
+            </a:r>
+          </a:p>
+        </p:txBody>
+      </p:sp>
+    </p:spTree>
+    <p:extLst>
+      <p:ext uri="{BB962C8B-B14F-4D97-AF65-F5344CB8AC3E}">
+        <p14:creationId xmlns:p14="http://schemas.microsoft.com/office/powerpoint/2010/main" val="2644054811"/>
       </p:ext>
     </p:extLst>
   </p:cSld>
@@ -7357,7 +7871,7 @@
         </p:nvCxnSpPr>
         <p:spPr>
           <a:xfrm>
-            <a:off x="1104293" y="2902686"/>
+            <a:off x="646111" y="3083440"/>
             <a:ext cx="1076362" cy="10633"/>
           </a:xfrm>
           <a:prstGeom prst="straightConnector1">
@@ -7398,7 +7912,7 @@
         </p:blipFill>
         <p:spPr>
           <a:xfrm>
-            <a:off x="2295525" y="2380030"/>
+            <a:off x="1837343" y="2560784"/>
             <a:ext cx="7600950" cy="3629025"/>
           </a:xfrm>
           <a:prstGeom prst="rect">
@@ -7414,7 +7928,7 @@
         </p:nvCxnSpPr>
         <p:spPr>
           <a:xfrm flipV="1">
-            <a:off x="1642474" y="5621907"/>
+            <a:off x="1184292" y="5802661"/>
             <a:ext cx="2509283" cy="450113"/>
           </a:xfrm>
           <a:prstGeom prst="straightConnector1">
@@ -7447,7 +7961,7 @@
         </p:nvSpPr>
         <p:spPr>
           <a:xfrm>
-            <a:off x="107930" y="4657890"/>
+            <a:off x="9767266" y="3339453"/>
             <a:ext cx="2033236" cy="1275074"/>
           </a:xfrm>
           <a:prstGeom prst="rect">
@@ -7487,7 +8001,7 @@
         </p:nvSpPr>
         <p:spPr>
           <a:xfrm>
-            <a:off x="107930" y="4708894"/>
+            <a:off x="9767266" y="3390457"/>
             <a:ext cx="2034840" cy="1169551"/>
           </a:xfrm>
           <a:prstGeom prst="rect">

</xml_diff>